<commit_message>
Modified powerpoint to use new Sequence diagram
</commit_message>
<xml_diff>
--- a/Trivia_Maze_Project/Resources/Presentation/Macrosoft’s TriviaMaze.pptx
+++ b/Trivia_Maze_Project/Resources/Presentation/Macrosoft’s TriviaMaze.pptx
@@ -403,7 +403,7 @@
           <a:p>
             <a:fld id="{42A3C16D-8635-4E37-970C-E56E0C602C30}" type="datetimeFigureOut">
               <a:rPr lang="en-US" smtClean="0"/>
-              <a:t>6/8/2014</a:t>
+              <a:t>6/10/2014</a:t>
             </a:fld>
             <a:endParaRPr lang="en-US"/>
           </a:p>
@@ -568,7 +568,7 @@
           <a:p>
             <a:fld id="{42A3C16D-8635-4E37-970C-E56E0C602C30}" type="datetimeFigureOut">
               <a:rPr lang="en-US" smtClean="0"/>
-              <a:t>6/8/2014</a:t>
+              <a:t>6/10/2014</a:t>
             </a:fld>
             <a:endParaRPr lang="en-US"/>
           </a:p>
@@ -743,7 +743,7 @@
           <a:p>
             <a:fld id="{42A3C16D-8635-4E37-970C-E56E0C602C30}" type="datetimeFigureOut">
               <a:rPr lang="en-US" smtClean="0"/>
-              <a:t>6/8/2014</a:t>
+              <a:t>6/10/2014</a:t>
             </a:fld>
             <a:endParaRPr lang="en-US"/>
           </a:p>
@@ -890,7 +890,7 @@
           <a:p>
             <a:fld id="{42A3C16D-8635-4E37-970C-E56E0C602C30}" type="datetimeFigureOut">
               <a:rPr lang="en-US" smtClean="0"/>
-              <a:t>6/8/2014</a:t>
+              <a:t>6/10/2014</a:t>
             </a:fld>
             <a:endParaRPr lang="en-US"/>
           </a:p>
@@ -1007,7 +1007,7 @@
           <a:p>
             <a:fld id="{42A3C16D-8635-4E37-970C-E56E0C602C30}" type="datetimeFigureOut">
               <a:rPr lang="en-US" smtClean="0"/>
-              <a:t>6/8/2014</a:t>
+              <a:t>6/10/2014</a:t>
             </a:fld>
             <a:endParaRPr lang="en-US"/>
           </a:p>
@@ -1277,7 +1277,7 @@
           <a:p>
             <a:fld id="{42A3C16D-8635-4E37-970C-E56E0C602C30}" type="datetimeFigureOut">
               <a:rPr lang="en-US" smtClean="0"/>
-              <a:t>6/8/2014</a:t>
+              <a:t>6/10/2014</a:t>
             </a:fld>
             <a:endParaRPr lang="en-US"/>
           </a:p>
@@ -1546,7 +1546,7 @@
           <a:p>
             <a:fld id="{42A3C16D-8635-4E37-970C-E56E0C602C30}" type="datetimeFigureOut">
               <a:rPr lang="en-US" smtClean="0"/>
-              <a:t>6/8/2014</a:t>
+              <a:t>6/10/2014</a:t>
             </a:fld>
             <a:endParaRPr lang="en-US"/>
           </a:p>
@@ -1993,7 +1993,7 @@
           <a:p>
             <a:fld id="{42A3C16D-8635-4E37-970C-E56E0C602C30}" type="datetimeFigureOut">
               <a:rPr lang="en-US" smtClean="0"/>
-              <a:t>6/8/2014</a:t>
+              <a:t>6/10/2014</a:t>
             </a:fld>
             <a:endParaRPr lang="en-US"/>
           </a:p>
@@ -2106,7 +2106,7 @@
           <a:p>
             <a:fld id="{42A3C16D-8635-4E37-970C-E56E0C602C30}" type="datetimeFigureOut">
               <a:rPr lang="en-US" smtClean="0"/>
-              <a:t>6/8/2014</a:t>
+              <a:t>6/10/2014</a:t>
             </a:fld>
             <a:endParaRPr lang="en-US"/>
           </a:p>
@@ -2356,7 +2356,7 @@
           <a:p>
             <a:fld id="{42A3C16D-8635-4E37-970C-E56E0C602C30}" type="datetimeFigureOut">
               <a:rPr lang="en-US" smtClean="0"/>
-              <a:t>6/8/2014</a:t>
+              <a:t>6/10/2014</a:t>
             </a:fld>
             <a:endParaRPr lang="en-US"/>
           </a:p>
@@ -2596,7 +2596,7 @@
           <a:p>
             <a:fld id="{42A3C16D-8635-4E37-970C-E56E0C602C30}" type="datetimeFigureOut">
               <a:rPr lang="en-US" smtClean="0"/>
-              <a:t>6/8/2014</a:t>
+              <a:t>6/10/2014</a:t>
             </a:fld>
             <a:endParaRPr lang="en-US"/>
           </a:p>
@@ -2769,7 +2769,7 @@
           <a:p>
             <a:fld id="{42A3C16D-8635-4E37-970C-E56E0C602C30}" type="datetimeFigureOut">
               <a:rPr lang="en-US" smtClean="0"/>
-              <a:t>6/8/2014</a:t>
+              <a:t>6/10/2014</a:t>
             </a:fld>
             <a:endParaRPr lang="en-US"/>
           </a:p>
@@ -3610,7 +3610,7 @@
             <p:ph idx="1"/>
           </p:nvPr>
         </p:nvPicPr>
-        <p:blipFill rotWithShape="1">
+        <p:blipFill>
           <a:blip r:embed="rId2">
             <a:extLst>
               <a:ext uri="{28A0092B-C50C-407E-A947-70E740481C1C}">
@@ -3618,13 +3618,14 @@
               </a:ext>
             </a:extLst>
           </a:blip>
-          <a:srcRect l="27778" t="12579" r="26458"/>
-          <a:stretch/>
+          <a:stretch>
+            <a:fillRect/>
+          </a:stretch>
         </p:blipFill>
         <p:spPr bwMode="auto">
           <a:xfrm>
-            <a:off x="152400" y="36944"/>
-            <a:ext cx="6629400" cy="6806721"/>
+            <a:off x="152400" y="76739"/>
+            <a:ext cx="6629400" cy="6727130"/>
           </a:xfrm>
           <a:prstGeom prst="rect">
             <a:avLst/>

</xml_diff>

<commit_message>
Added sequence diagram with white background
And added it to the presentation
</commit_message>
<xml_diff>
--- a/Trivia_Maze_Project/Resources/Presentation/Macrosoft’s TriviaMaze.pptx
+++ b/Trivia_Maze_Project/Resources/Presentation/Macrosoft’s TriviaMaze.pptx
@@ -403,7 +403,7 @@
           <a:p>
             <a:fld id="{42A3C16D-8635-4E37-970C-E56E0C602C30}" type="datetimeFigureOut">
               <a:rPr lang="en-US" smtClean="0"/>
-              <a:t>6/10/2014</a:t>
+              <a:t>6/11/2014</a:t>
             </a:fld>
             <a:endParaRPr lang="en-US"/>
           </a:p>
@@ -568,7 +568,7 @@
           <a:p>
             <a:fld id="{42A3C16D-8635-4E37-970C-E56E0C602C30}" type="datetimeFigureOut">
               <a:rPr lang="en-US" smtClean="0"/>
-              <a:t>6/10/2014</a:t>
+              <a:t>6/11/2014</a:t>
             </a:fld>
             <a:endParaRPr lang="en-US"/>
           </a:p>
@@ -743,7 +743,7 @@
           <a:p>
             <a:fld id="{42A3C16D-8635-4E37-970C-E56E0C602C30}" type="datetimeFigureOut">
               <a:rPr lang="en-US" smtClean="0"/>
-              <a:t>6/10/2014</a:t>
+              <a:t>6/11/2014</a:t>
             </a:fld>
             <a:endParaRPr lang="en-US"/>
           </a:p>
@@ -890,7 +890,7 @@
           <a:p>
             <a:fld id="{42A3C16D-8635-4E37-970C-E56E0C602C30}" type="datetimeFigureOut">
               <a:rPr lang="en-US" smtClean="0"/>
-              <a:t>6/10/2014</a:t>
+              <a:t>6/11/2014</a:t>
             </a:fld>
             <a:endParaRPr lang="en-US"/>
           </a:p>
@@ -1007,7 +1007,7 @@
           <a:p>
             <a:fld id="{42A3C16D-8635-4E37-970C-E56E0C602C30}" type="datetimeFigureOut">
               <a:rPr lang="en-US" smtClean="0"/>
-              <a:t>6/10/2014</a:t>
+              <a:t>6/11/2014</a:t>
             </a:fld>
             <a:endParaRPr lang="en-US"/>
           </a:p>
@@ -1277,7 +1277,7 @@
           <a:p>
             <a:fld id="{42A3C16D-8635-4E37-970C-E56E0C602C30}" type="datetimeFigureOut">
               <a:rPr lang="en-US" smtClean="0"/>
-              <a:t>6/10/2014</a:t>
+              <a:t>6/11/2014</a:t>
             </a:fld>
             <a:endParaRPr lang="en-US"/>
           </a:p>
@@ -1546,7 +1546,7 @@
           <a:p>
             <a:fld id="{42A3C16D-8635-4E37-970C-E56E0C602C30}" type="datetimeFigureOut">
               <a:rPr lang="en-US" smtClean="0"/>
-              <a:t>6/10/2014</a:t>
+              <a:t>6/11/2014</a:t>
             </a:fld>
             <a:endParaRPr lang="en-US"/>
           </a:p>
@@ -1993,7 +1993,7 @@
           <a:p>
             <a:fld id="{42A3C16D-8635-4E37-970C-E56E0C602C30}" type="datetimeFigureOut">
               <a:rPr lang="en-US" smtClean="0"/>
-              <a:t>6/10/2014</a:t>
+              <a:t>6/11/2014</a:t>
             </a:fld>
             <a:endParaRPr lang="en-US"/>
           </a:p>
@@ -2106,7 +2106,7 @@
           <a:p>
             <a:fld id="{42A3C16D-8635-4E37-970C-E56E0C602C30}" type="datetimeFigureOut">
               <a:rPr lang="en-US" smtClean="0"/>
-              <a:t>6/10/2014</a:t>
+              <a:t>6/11/2014</a:t>
             </a:fld>
             <a:endParaRPr lang="en-US"/>
           </a:p>
@@ -2356,7 +2356,7 @@
           <a:p>
             <a:fld id="{42A3C16D-8635-4E37-970C-E56E0C602C30}" type="datetimeFigureOut">
               <a:rPr lang="en-US" smtClean="0"/>
-              <a:t>6/10/2014</a:t>
+              <a:t>6/11/2014</a:t>
             </a:fld>
             <a:endParaRPr lang="en-US"/>
           </a:p>
@@ -2596,7 +2596,7 @@
           <a:p>
             <a:fld id="{42A3C16D-8635-4E37-970C-E56E0C602C30}" type="datetimeFigureOut">
               <a:rPr lang="en-US" smtClean="0"/>
-              <a:t>6/10/2014</a:t>
+              <a:t>6/11/2014</a:t>
             </a:fld>
             <a:endParaRPr lang="en-US"/>
           </a:p>
@@ -2769,7 +2769,7 @@
           <a:p>
             <a:fld id="{42A3C16D-8635-4E37-970C-E56E0C602C30}" type="datetimeFigureOut">
               <a:rPr lang="en-US" smtClean="0"/>
-              <a:t>6/10/2014</a:t>
+              <a:t>6/11/2014</a:t>
             </a:fld>
             <a:endParaRPr lang="en-US"/>
           </a:p>
@@ -3625,7 +3625,7 @@
         <p:spPr bwMode="auto">
           <a:xfrm>
             <a:off x="152400" y="76739"/>
-            <a:ext cx="6629400" cy="6727130"/>
+            <a:ext cx="6629399" cy="6727130"/>
           </a:xfrm>
           <a:prstGeom prst="rect">
             <a:avLst/>

</xml_diff>

<commit_message>
Updated State Diagram via Austin's new image
Added state diagram to powerpoint
</commit_message>
<xml_diff>
--- a/Trivia_Maze_Project/Resources/Presentation/Macrosoft’s TriviaMaze.pptx
+++ b/Trivia_Maze_Project/Resources/Presentation/Macrosoft’s TriviaMaze.pptx
@@ -115,7 +115,7 @@
   </p:defaultTextStyle>
   <p:extLst>
     <p:ext uri="{EFAFB233-063F-42B5-8137-9DF3F51BA10A}">
-      <p15:sldGuideLst xmlns:p15="http://schemas.microsoft.com/office/powerpoint/2012/main">
+      <p15:sldGuideLst xmlns:p15="http://schemas.microsoft.com/office/powerpoint/2012/main" xmlns="">
         <p15:guide id="1" orient="horz" pos="2160">
           <p15:clr>
             <a:srgbClr val="A4A3A4"/>
@@ -528,11 +528,198 @@
           <a:p>
             <a:r>
               <a:rPr lang="en-US" dirty="0" smtClean="0"/>
-              <a:t>Transition</a:t>
+              <a:t>Next: Austin -  State Diagram</a:t>
             </a:r>
             <a:r>
               <a:rPr lang="en-US" baseline="0" dirty="0" smtClean="0"/>
-              <a:t> to demo</a:t>
+              <a:t> of Game Flow</a:t>
+            </a:r>
+          </a:p>
+        </p:txBody>
+      </p:sp>
+      <p:sp>
+        <p:nvSpPr>
+          <p:cNvPr id="4" name="Slide Number Placeholder 3"/>
+          <p:cNvSpPr>
+            <a:spLocks noGrp="1"/>
+          </p:cNvSpPr>
+          <p:nvPr>
+            <p:ph type="sldNum" sz="quarter" idx="10"/>
+          </p:nvPr>
+        </p:nvSpPr>
+        <p:spPr/>
+        <p:txBody>
+          <a:bodyPr/>
+          <a:lstStyle/>
+          <a:p>
+            <a:fld id="{32DE3108-007C-4617-BF92-BB152E3CDBFF}" type="slidenum">
+              <a:rPr lang="en-US" smtClean="0"/>
+              <a:t>2</a:t>
+            </a:fld>
+            <a:endParaRPr lang="en-US"/>
+          </a:p>
+        </p:txBody>
+      </p:sp>
+    </p:spTree>
+    <p:extLst>
+      <p:ext uri="{BB962C8B-B14F-4D97-AF65-F5344CB8AC3E}">
+        <p14:creationId xmlns:p14="http://schemas.microsoft.com/office/powerpoint/2010/main" val="1735022632"/>
+      </p:ext>
+    </p:extLst>
+  </p:cSld>
+  <p:clrMapOvr>
+    <a:masterClrMapping/>
+  </p:clrMapOvr>
+</p:notes>
+</file>
+
+<file path=ppt/notesSlides/notesSlide2.xml><?xml version="1.0" encoding="utf-8"?>
+<p:notes xmlns:a="http://schemas.openxmlformats.org/drawingml/2006/main" xmlns:r="http://schemas.openxmlformats.org/officeDocument/2006/relationships" xmlns:p="http://schemas.openxmlformats.org/presentationml/2006/main">
+  <p:cSld>
+    <p:spTree>
+      <p:nvGrpSpPr>
+        <p:cNvPr id="1" name=""/>
+        <p:cNvGrpSpPr/>
+        <p:nvPr/>
+      </p:nvGrpSpPr>
+      <p:grpSpPr>
+        <a:xfrm>
+          <a:off x="0" y="0"/>
+          <a:ext cx="0" cy="0"/>
+          <a:chOff x="0" y="0"/>
+          <a:chExt cx="0" cy="0"/>
+        </a:xfrm>
+      </p:grpSpPr>
+      <p:sp>
+        <p:nvSpPr>
+          <p:cNvPr id="2" name="Slide Image Placeholder 1"/>
+          <p:cNvSpPr>
+            <a:spLocks noGrp="1" noRot="1" noChangeAspect="1"/>
+          </p:cNvSpPr>
+          <p:nvPr>
+            <p:ph type="sldImg"/>
+          </p:nvPr>
+        </p:nvSpPr>
+        <p:spPr/>
+      </p:sp>
+      <p:sp>
+        <p:nvSpPr>
+          <p:cNvPr id="3" name="Notes Placeholder 2"/>
+          <p:cNvSpPr>
+            <a:spLocks noGrp="1"/>
+          </p:cNvSpPr>
+          <p:nvPr>
+            <p:ph type="body" idx="1"/>
+          </p:nvPr>
+        </p:nvSpPr>
+        <p:spPr/>
+        <p:txBody>
+          <a:bodyPr/>
+          <a:lstStyle/>
+          <a:p>
+            <a:r>
+              <a:rPr lang="en-US" dirty="0" smtClean="0"/>
+              <a:t>Next: Isaiah</a:t>
+            </a:r>
+            <a:r>
+              <a:rPr lang="en-US" baseline="0" dirty="0" smtClean="0"/>
+              <a:t> – </a:t>
+            </a:r>
+            <a:r>
+              <a:rPr lang="en-US" baseline="0" smtClean="0"/>
+              <a:t>Class Diagram</a:t>
+            </a:r>
+            <a:endParaRPr lang="en-US"/>
+          </a:p>
+        </p:txBody>
+      </p:sp>
+      <p:sp>
+        <p:nvSpPr>
+          <p:cNvPr id="4" name="Slide Number Placeholder 3"/>
+          <p:cNvSpPr>
+            <a:spLocks noGrp="1"/>
+          </p:cNvSpPr>
+          <p:nvPr>
+            <p:ph type="sldNum" sz="quarter" idx="10"/>
+          </p:nvPr>
+        </p:nvSpPr>
+        <p:spPr/>
+        <p:txBody>
+          <a:bodyPr/>
+          <a:lstStyle/>
+          <a:p>
+            <a:fld id="{32DE3108-007C-4617-BF92-BB152E3CDBFF}" type="slidenum">
+              <a:rPr lang="en-US" smtClean="0"/>
+              <a:t>3</a:t>
+            </a:fld>
+            <a:endParaRPr lang="en-US"/>
+          </a:p>
+        </p:txBody>
+      </p:sp>
+    </p:spTree>
+    <p:extLst>
+      <p:ext uri="{BB962C8B-B14F-4D97-AF65-F5344CB8AC3E}">
+        <p14:creationId xmlns:p14="http://schemas.microsoft.com/office/powerpoint/2010/main" val="4077534083"/>
+      </p:ext>
+    </p:extLst>
+  </p:cSld>
+  <p:clrMapOvr>
+    <a:masterClrMapping/>
+  </p:clrMapOvr>
+</p:notes>
+</file>
+
+<file path=ppt/notesSlides/notesSlide3.xml><?xml version="1.0" encoding="utf-8"?>
+<p:notes xmlns:a="http://schemas.openxmlformats.org/drawingml/2006/main" xmlns:r="http://schemas.openxmlformats.org/officeDocument/2006/relationships" xmlns:p="http://schemas.openxmlformats.org/presentationml/2006/main">
+  <p:cSld>
+    <p:spTree>
+      <p:nvGrpSpPr>
+        <p:cNvPr id="1" name=""/>
+        <p:cNvGrpSpPr/>
+        <p:nvPr/>
+      </p:nvGrpSpPr>
+      <p:grpSpPr>
+        <a:xfrm>
+          <a:off x="0" y="0"/>
+          <a:ext cx="0" cy="0"/>
+          <a:chOff x="0" y="0"/>
+          <a:chExt cx="0" cy="0"/>
+        </a:xfrm>
+      </p:grpSpPr>
+      <p:sp>
+        <p:nvSpPr>
+          <p:cNvPr id="2" name="Slide Image Placeholder 1"/>
+          <p:cNvSpPr>
+            <a:spLocks noGrp="1" noRot="1" noChangeAspect="1"/>
+          </p:cNvSpPr>
+          <p:nvPr>
+            <p:ph type="sldImg"/>
+          </p:nvPr>
+        </p:nvSpPr>
+        <p:spPr/>
+      </p:sp>
+      <p:sp>
+        <p:nvSpPr>
+          <p:cNvPr id="3" name="Notes Placeholder 2"/>
+          <p:cNvSpPr>
+            <a:spLocks noGrp="1"/>
+          </p:cNvSpPr>
+          <p:nvPr>
+            <p:ph type="body" idx="1"/>
+          </p:nvPr>
+        </p:nvSpPr>
+        <p:spPr/>
+        <p:txBody>
+          <a:bodyPr/>
+          <a:lstStyle/>
+          <a:p>
+            <a:r>
+              <a:rPr lang="en-US" dirty="0" smtClean="0"/>
+              <a:t>Next: Andrey -</a:t>
+            </a:r>
+            <a:r>
+              <a:rPr lang="en-US" baseline="0" dirty="0" smtClean="0"/>
+              <a:t> Demo of Game</a:t>
             </a:r>
             <a:endParaRPr lang="en-US" dirty="0"/>
           </a:p>
@@ -3931,28 +4118,38 @@
           <a:chExt cx="0" cy="0"/>
         </a:xfrm>
       </p:grpSpPr>
-      <p:sp>
-        <p:nvSpPr>
-          <p:cNvPr id="3" name="Content Placeholder 2"/>
-          <p:cNvSpPr>
-            <a:spLocks noGrp="1"/>
-          </p:cNvSpPr>
+      <p:pic>
+        <p:nvPicPr>
+          <p:cNvPr id="6" name="Content Placeholder 5"/>
+          <p:cNvPicPr>
+            <a:picLocks noGrp="1" noChangeAspect="1"/>
+          </p:cNvPicPr>
           <p:nvPr>
             <p:ph idx="1"/>
           </p:nvPr>
-        </p:nvSpPr>
-        <p:spPr/>
-        <p:txBody>
-          <a:bodyPr/>
-          <a:lstStyle/>
-          <a:p>
-            <a:endParaRPr lang="en-US"/>
-          </a:p>
-        </p:txBody>
-      </p:sp>
-      <p:sp>
-        <p:nvSpPr>
-          <p:cNvPr id="2" name="Title 1"/>
+        </p:nvPicPr>
+        <p:blipFill>
+          <a:blip r:embed="rId3">
+            <a:extLst>
+              <a:ext uri="{28A0092B-C50C-407E-A947-70E740481C1C}">
+                <a14:useLocalDpi xmlns:a14="http://schemas.microsoft.com/office/drawing/2010/main" val="0"/>
+              </a:ext>
+            </a:extLst>
+          </a:blip>
+          <a:stretch>
+            <a:fillRect/>
+          </a:stretch>
+        </p:blipFill>
+        <p:spPr>
+          <a:xfrm>
+            <a:off x="160202" y="0"/>
+            <a:ext cx="6773998" cy="6797197"/>
+          </a:xfrm>
+        </p:spPr>
+      </p:pic>
+      <p:sp>
+        <p:nvSpPr>
+          <p:cNvPr id="7" name="Title 1"/>
           <p:cNvSpPr>
             <a:spLocks noGrp="1"/>
           </p:cNvSpPr>
@@ -3960,28 +4157,23 @@
             <p:ph type="title"/>
           </p:nvPr>
         </p:nvSpPr>
-        <p:spPr/>
-        <p:txBody>
-          <a:bodyPr/>
-          <a:lstStyle/>
-          <a:p>
-            <a:r>
-              <a:rPr lang="en-US" dirty="0" smtClean="0"/>
-              <a:t>UML – </a:t>
-            </a:r>
-            <a:r>
-              <a:rPr lang="en-US" dirty="0" smtClean="0"/>
+        <p:spPr>
+          <a:xfrm>
+            <a:off x="7239000" y="1447800"/>
+            <a:ext cx="1600200" cy="3916362"/>
+          </a:xfrm>
+        </p:spPr>
+        <p:txBody>
+          <a:bodyPr vert="wordArtVert">
+            <a:normAutofit/>
+          </a:bodyPr>
+          <a:lstStyle/>
+          <a:p>
+            <a:r>
+              <a:rPr lang="en-US" sz="3600" dirty="0" smtClean="0"/>
               <a:t>State</a:t>
             </a:r>
-            <a:r>
-              <a:rPr lang="en-US" dirty="0" smtClean="0"/>
-              <a:t> </a:t>
-            </a:r>
-            <a:r>
-              <a:rPr lang="en-US" dirty="0" smtClean="0"/>
-              <a:t>Diagram</a:t>
-            </a:r>
-            <a:endParaRPr lang="en-US" dirty="0"/>
+            <a:endParaRPr lang="en-US" sz="3600" dirty="0"/>
           </a:p>
         </p:txBody>
       </p:sp>
@@ -4058,15 +4250,7 @@
           <a:p>
             <a:r>
               <a:rPr lang="en-US" dirty="0" smtClean="0"/>
-              <a:t>UML – </a:t>
-            </a:r>
-            <a:r>
-              <a:rPr lang="en-US" dirty="0" smtClean="0"/>
-              <a:t>Class </a:t>
-            </a:r>
-            <a:r>
-              <a:rPr lang="en-US" dirty="0" smtClean="0"/>
-              <a:t>Diagram</a:t>
+              <a:t>UML – Class Diagram</a:t>
             </a:r>
             <a:endParaRPr lang="en-US" dirty="0"/>
           </a:p>
@@ -4879,7 +5063,7 @@
   <a:extraClrSchemeLst/>
   <a:extLst>
     <a:ext uri="{05A4C25C-085E-4340-85A3-A5531E510DB2}">
-      <thm15:themeFamily xmlns:thm15="http://schemas.microsoft.com/office/thememl/2012/main" name="Office Theme" id="{62F939B6-93AF-4DB8-9C6B-D6C7DFDC589F}" vid="{4A3C46E8-61CC-4603-A589-7422A47A8E4A}"/>
+      <thm15:themeFamily xmlns:thm15="http://schemas.microsoft.com/office/thememl/2012/main" xmlns="" name="Office Theme" id="{62F939B6-93AF-4DB8-9C6B-D6C7DFDC589F}" vid="{4A3C46E8-61CC-4603-A589-7422A47A8E4A}"/>
     </a:ext>
   </a:extLst>
 </a:theme>

</xml_diff>

<commit_message>
Added State diagram to SRS
</commit_message>
<xml_diff>
--- a/Trivia_Maze_Project/Resources/Presentation/Macrosoft’s TriviaMaze.pptx
+++ b/Trivia_Maze_Project/Resources/Presentation/Macrosoft’s TriviaMaze.pptx
@@ -623,13 +623,9 @@
             </a:r>
             <a:r>
               <a:rPr lang="en-US" baseline="0" dirty="0" smtClean="0"/>
-              <a:t> – </a:t>
-            </a:r>
-            <a:r>
-              <a:rPr lang="en-US" baseline="0" smtClean="0"/>
-              <a:t>Class Diagram</a:t>
-            </a:r>
-            <a:endParaRPr lang="en-US"/>
+              <a:t> – Class Diagram</a:t>
+            </a:r>
+            <a:endParaRPr lang="en-US" dirty="0"/>
           </a:p>
         </p:txBody>
       </p:sp>

</xml_diff>